<commit_message>
added adjustments to arch
</commit_message>
<xml_diff>
--- a/reports/figures/architecture.pptx
+++ b/reports/figures/architecture.pptx
@@ -260,7 +260,7 @@
           <a:p>
             <a:fld id="{323BCBB8-5538-46B0-B019-253A79DAA8A5}" type="datetimeFigureOut">
               <a:rPr lang="en-US" smtClean="0"/>
-              <a:t>10/20/2024</a:t>
+              <a:t>11/9/2024</a:t>
             </a:fld>
             <a:endParaRPr lang="en-US"/>
           </a:p>
@@ -458,7 +458,7 @@
           <a:p>
             <a:fld id="{323BCBB8-5538-46B0-B019-253A79DAA8A5}" type="datetimeFigureOut">
               <a:rPr lang="en-US" smtClean="0"/>
-              <a:t>10/20/2024</a:t>
+              <a:t>11/9/2024</a:t>
             </a:fld>
             <a:endParaRPr lang="en-US"/>
           </a:p>
@@ -666,7 +666,7 @@
           <a:p>
             <a:fld id="{323BCBB8-5538-46B0-B019-253A79DAA8A5}" type="datetimeFigureOut">
               <a:rPr lang="en-US" smtClean="0"/>
-              <a:t>10/20/2024</a:t>
+              <a:t>11/9/2024</a:t>
             </a:fld>
             <a:endParaRPr lang="en-US"/>
           </a:p>
@@ -864,7 +864,7 @@
           <a:p>
             <a:fld id="{323BCBB8-5538-46B0-B019-253A79DAA8A5}" type="datetimeFigureOut">
               <a:rPr lang="en-US" smtClean="0"/>
-              <a:t>10/20/2024</a:t>
+              <a:t>11/9/2024</a:t>
             </a:fld>
             <a:endParaRPr lang="en-US"/>
           </a:p>
@@ -1139,7 +1139,7 @@
           <a:p>
             <a:fld id="{323BCBB8-5538-46B0-B019-253A79DAA8A5}" type="datetimeFigureOut">
               <a:rPr lang="en-US" smtClean="0"/>
-              <a:t>10/20/2024</a:t>
+              <a:t>11/9/2024</a:t>
             </a:fld>
             <a:endParaRPr lang="en-US"/>
           </a:p>
@@ -1404,7 +1404,7 @@
           <a:p>
             <a:fld id="{323BCBB8-5538-46B0-B019-253A79DAA8A5}" type="datetimeFigureOut">
               <a:rPr lang="en-US" smtClean="0"/>
-              <a:t>10/20/2024</a:t>
+              <a:t>11/9/2024</a:t>
             </a:fld>
             <a:endParaRPr lang="en-US"/>
           </a:p>
@@ -1816,7 +1816,7 @@
           <a:p>
             <a:fld id="{323BCBB8-5538-46B0-B019-253A79DAA8A5}" type="datetimeFigureOut">
               <a:rPr lang="en-US" smtClean="0"/>
-              <a:t>10/20/2024</a:t>
+              <a:t>11/9/2024</a:t>
             </a:fld>
             <a:endParaRPr lang="en-US"/>
           </a:p>
@@ -1957,7 +1957,7 @@
           <a:p>
             <a:fld id="{323BCBB8-5538-46B0-B019-253A79DAA8A5}" type="datetimeFigureOut">
               <a:rPr lang="en-US" smtClean="0"/>
-              <a:t>10/20/2024</a:t>
+              <a:t>11/9/2024</a:t>
             </a:fld>
             <a:endParaRPr lang="en-US"/>
           </a:p>
@@ -2070,7 +2070,7 @@
           <a:p>
             <a:fld id="{323BCBB8-5538-46B0-B019-253A79DAA8A5}" type="datetimeFigureOut">
               <a:rPr lang="en-US" smtClean="0"/>
-              <a:t>10/20/2024</a:t>
+              <a:t>11/9/2024</a:t>
             </a:fld>
             <a:endParaRPr lang="en-US"/>
           </a:p>
@@ -2381,7 +2381,7 @@
           <a:p>
             <a:fld id="{323BCBB8-5538-46B0-B019-253A79DAA8A5}" type="datetimeFigureOut">
               <a:rPr lang="en-US" smtClean="0"/>
-              <a:t>10/20/2024</a:t>
+              <a:t>11/9/2024</a:t>
             </a:fld>
             <a:endParaRPr lang="en-US"/>
           </a:p>
@@ -2669,7 +2669,7 @@
           <a:p>
             <a:fld id="{323BCBB8-5538-46B0-B019-253A79DAA8A5}" type="datetimeFigureOut">
               <a:rPr lang="en-US" smtClean="0"/>
-              <a:t>10/20/2024</a:t>
+              <a:t>11/9/2024</a:t>
             </a:fld>
             <a:endParaRPr lang="en-US"/>
           </a:p>
@@ -2910,7 +2910,7 @@
           <a:p>
             <a:fld id="{323BCBB8-5538-46B0-B019-253A79DAA8A5}" type="datetimeFigureOut">
               <a:rPr lang="en-US" smtClean="0"/>
-              <a:t>10/20/2024</a:t>
+              <a:t>11/9/2024</a:t>
             </a:fld>
             <a:endParaRPr lang="en-US"/>
           </a:p>
@@ -3831,8 +3831,8 @@
         </p:nvSpPr>
         <p:spPr>
           <a:xfrm>
-            <a:off x="2406647" y="3882509"/>
-            <a:ext cx="4518028" cy="2908816"/>
+            <a:off x="2406646" y="3882509"/>
+            <a:ext cx="5257803" cy="2908816"/>
           </a:xfrm>
           <a:prstGeom prst="roundRect">
             <a:avLst/>
@@ -3861,7 +3861,7 @@
             <a:pPr algn="ctr"/>
             <a:r>
               <a:rPr lang="en-US" sz="2400" b="1" dirty="0"/>
-              <a:t>PC</a:t>
+              <a:t>            PC</a:t>
             </a:r>
             <a:endParaRPr lang="en-US" b="1" dirty="0"/>
           </a:p>
@@ -4049,51 +4049,6 @@
       </p:sp>
       <p:cxnSp>
         <p:nvCxnSpPr>
-          <p:cNvPr id="14" name="Connector: Elbow 13">
-            <a:extLst>
-              <a:ext uri="{FF2B5EF4-FFF2-40B4-BE49-F238E27FC236}">
-                <a16:creationId xmlns:a16="http://schemas.microsoft.com/office/drawing/2014/main" id="{F818EB0F-73E1-E468-0CB8-B49C79D6A218}"/>
-              </a:ext>
-            </a:extLst>
-          </p:cNvPr>
-          <p:cNvCxnSpPr>
-            <a:cxnSpLocks/>
-            <a:stCxn id="43" idx="1"/>
-            <a:endCxn id="52" idx="1"/>
-          </p:cNvCxnSpPr>
-          <p:nvPr/>
-        </p:nvCxnSpPr>
-        <p:spPr>
-          <a:xfrm rot="10800000" flipV="1">
-            <a:off x="2589473" y="1798078"/>
-            <a:ext cx="604466" cy="3538837"/>
-          </a:xfrm>
-          <a:prstGeom prst="bentConnector3">
-            <a:avLst>
-              <a:gd name="adj1" fmla="val 386448"/>
-            </a:avLst>
-          </a:prstGeom>
-          <a:ln w="38100">
-            <a:tailEnd type="triangle"/>
-          </a:ln>
-        </p:spPr>
-        <p:style>
-          <a:lnRef idx="2">
-            <a:schemeClr val="accent1"/>
-          </a:lnRef>
-          <a:fillRef idx="0">
-            <a:schemeClr val="accent1"/>
-          </a:fillRef>
-          <a:effectRef idx="1">
-            <a:schemeClr val="accent1"/>
-          </a:effectRef>
-          <a:fontRef idx="minor">
-            <a:schemeClr val="tx1"/>
-          </a:fontRef>
-        </p:style>
-      </p:cxnSp>
-      <p:cxnSp>
-        <p:nvCxnSpPr>
           <p:cNvPr id="18" name="Connector: Elbow 17">
             <a:extLst>
               <a:ext uri="{FF2B5EF4-FFF2-40B4-BE49-F238E27FC236}">
@@ -4110,8 +4065,8 @@
         </p:nvCxnSpPr>
         <p:spPr>
           <a:xfrm flipV="1">
-            <a:off x="6601113" y="3749054"/>
-            <a:ext cx="2476213" cy="1587861"/>
+            <a:off x="7454903" y="3749054"/>
+            <a:ext cx="1622423" cy="1587861"/>
           </a:xfrm>
           <a:prstGeom prst="bentConnector2">
             <a:avLst/>
@@ -4153,7 +4108,7 @@
         </p:nvSpPr>
         <p:spPr>
           <a:xfrm>
-            <a:off x="6965951" y="5407978"/>
+            <a:off x="7696745" y="5336915"/>
             <a:ext cx="2190750" cy="646331"/>
           </a:xfrm>
           <a:prstGeom prst="rect">
@@ -4773,8 +4728,8 @@
         </p:nvSpPr>
         <p:spPr>
           <a:xfrm>
-            <a:off x="2589473" y="4134540"/>
-            <a:ext cx="1770804" cy="701159"/>
+            <a:off x="2649589" y="4234034"/>
+            <a:ext cx="2558190" cy="1520830"/>
           </a:xfrm>
           <a:prstGeom prst="roundRect">
             <a:avLst/>
@@ -4797,7 +4752,7 @@
           </a:fontRef>
         </p:style>
         <p:txBody>
-          <a:bodyPr rtlCol="0" anchor="ctr"/>
+          <a:bodyPr rtlCol="0" anchor="t"/>
           <a:lstStyle/>
           <a:p>
             <a:pPr algn="ctr"/>
@@ -4822,7 +4777,7 @@
         </p:nvSpPr>
         <p:spPr>
           <a:xfrm>
-            <a:off x="2589473" y="4986336"/>
+            <a:off x="3013225" y="4860570"/>
             <a:ext cx="1770803" cy="701159"/>
           </a:xfrm>
           <a:prstGeom prst="roundRect">
@@ -4871,8 +4826,8 @@
         </p:nvSpPr>
         <p:spPr>
           <a:xfrm>
-            <a:off x="2589474" y="5844657"/>
-            <a:ext cx="1770803" cy="789505"/>
+            <a:off x="2654505" y="5887096"/>
+            <a:ext cx="2553274" cy="789505"/>
           </a:xfrm>
           <a:prstGeom prst="roundRect">
             <a:avLst/>
@@ -4924,13 +4879,13 @@
         </p:nvCxnSpPr>
         <p:spPr>
           <a:xfrm rot="10800000" flipH="1" flipV="1">
-            <a:off x="2557177" y="970904"/>
-            <a:ext cx="917697" cy="3163636"/>
+            <a:off x="2557178" y="970904"/>
+            <a:ext cx="1371506" cy="3263130"/>
           </a:xfrm>
           <a:prstGeom prst="bentConnector4">
             <a:avLst>
-              <a:gd name="adj1" fmla="val -136389"/>
-              <a:gd name="adj2" fmla="val 69850"/>
+              <a:gd name="adj1" fmla="val -16668"/>
+              <a:gd name="adj2" fmla="val 55372"/>
             </a:avLst>
           </a:prstGeom>
           <a:ln w="38100">
@@ -4969,8 +4924,8 @@
         </p:nvSpPr>
         <p:spPr>
           <a:xfrm>
-            <a:off x="1398398" y="2837872"/>
-            <a:ext cx="2565589" cy="369332"/>
+            <a:off x="2358473" y="2831313"/>
+            <a:ext cx="1351151" cy="646331"/>
           </a:xfrm>
           <a:prstGeom prst="rect">
             <a:avLst/>
@@ -5004,7 +4959,7 @@
         </p:nvSpPr>
         <p:spPr>
           <a:xfrm>
-            <a:off x="5164158" y="4333807"/>
+            <a:off x="6017948" y="4333807"/>
             <a:ext cx="1436955" cy="2006216"/>
           </a:xfrm>
           <a:prstGeom prst="roundRect">
@@ -5049,6 +5004,7 @@
             </a:extLst>
           </p:cNvPr>
           <p:cNvCxnSpPr>
+            <a:cxnSpLocks/>
             <a:stCxn id="51" idx="3"/>
             <a:endCxn id="49" idx="1"/>
           </p:cNvCxnSpPr>
@@ -5056,51 +5012,8 @@
         </p:nvCxnSpPr>
         <p:spPr>
           <a:xfrm>
-            <a:off x="4360277" y="4485120"/>
-            <a:ext cx="803881" cy="851795"/>
-          </a:xfrm>
-          <a:prstGeom prst="straightConnector1">
-            <a:avLst/>
-          </a:prstGeom>
-          <a:ln w="57150">
-            <a:tailEnd type="triangle"/>
-          </a:ln>
-        </p:spPr>
-        <p:style>
-          <a:lnRef idx="2">
-            <a:schemeClr val="dk1"/>
-          </a:lnRef>
-          <a:fillRef idx="0">
-            <a:schemeClr val="dk1"/>
-          </a:fillRef>
-          <a:effectRef idx="1">
-            <a:schemeClr val="dk1"/>
-          </a:effectRef>
-          <a:fontRef idx="minor">
-            <a:schemeClr val="tx1"/>
-          </a:fontRef>
-        </p:style>
-      </p:cxnSp>
-      <p:cxnSp>
-        <p:nvCxnSpPr>
-          <p:cNvPr id="58" name="Straight Arrow Connector 57">
-            <a:extLst>
-              <a:ext uri="{FF2B5EF4-FFF2-40B4-BE49-F238E27FC236}">
-                <a16:creationId xmlns:a16="http://schemas.microsoft.com/office/drawing/2014/main" id="{E6FA9855-D7CF-5711-2F09-6E99F4E59F70}"/>
-              </a:ext>
-            </a:extLst>
-          </p:cNvPr>
-          <p:cNvCxnSpPr>
-            <a:cxnSpLocks/>
-            <a:stCxn id="52" idx="3"/>
-            <a:endCxn id="49" idx="1"/>
-          </p:cNvCxnSpPr>
-          <p:nvPr/>
-        </p:nvCxnSpPr>
-        <p:spPr>
-          <a:xfrm flipV="1">
-            <a:off x="4360276" y="5336915"/>
-            <a:ext cx="803882" cy="1"/>
+            <a:off x="5207779" y="4994449"/>
+            <a:ext cx="810169" cy="342466"/>
           </a:xfrm>
           <a:prstGeom prst="straightConnector1">
             <a:avLst/>
@@ -5142,8 +5055,8 @@
         </p:nvCxnSpPr>
         <p:spPr>
           <a:xfrm flipV="1">
-            <a:off x="4360277" y="5336915"/>
-            <a:ext cx="803881" cy="902495"/>
+            <a:off x="5207779" y="5336915"/>
+            <a:ext cx="810169" cy="944934"/>
           </a:xfrm>
           <a:prstGeom prst="straightConnector1">
             <a:avLst/>
@@ -5161,6 +5074,51 @@
           </a:fillRef>
           <a:effectRef idx="1">
             <a:schemeClr val="dk1"/>
+          </a:effectRef>
+          <a:fontRef idx="minor">
+            <a:schemeClr val="tx1"/>
+          </a:fontRef>
+        </p:style>
+      </p:cxnSp>
+      <p:cxnSp>
+        <p:nvCxnSpPr>
+          <p:cNvPr id="14" name="Connector: Elbow 13">
+            <a:extLst>
+              <a:ext uri="{FF2B5EF4-FFF2-40B4-BE49-F238E27FC236}">
+                <a16:creationId xmlns:a16="http://schemas.microsoft.com/office/drawing/2014/main" id="{F818EB0F-73E1-E468-0CB8-B49C79D6A218}"/>
+              </a:ext>
+            </a:extLst>
+          </p:cNvPr>
+          <p:cNvCxnSpPr>
+            <a:cxnSpLocks/>
+            <a:stCxn id="43" idx="1"/>
+            <a:endCxn id="52" idx="1"/>
+          </p:cNvCxnSpPr>
+          <p:nvPr/>
+        </p:nvCxnSpPr>
+        <p:spPr>
+          <a:xfrm rot="10800000" flipV="1">
+            <a:off x="3013225" y="1798078"/>
+            <a:ext cx="180714" cy="3413071"/>
+          </a:xfrm>
+          <a:prstGeom prst="bentConnector3">
+            <a:avLst>
+              <a:gd name="adj1" fmla="val 1266595"/>
+            </a:avLst>
+          </a:prstGeom>
+          <a:ln w="38100">
+            <a:tailEnd type="triangle"/>
+          </a:ln>
+        </p:spPr>
+        <p:style>
+          <a:lnRef idx="2">
+            <a:schemeClr val="accent1"/>
+          </a:lnRef>
+          <a:fillRef idx="0">
+            <a:schemeClr val="accent1"/>
+          </a:fillRef>
+          <a:effectRef idx="1">
+            <a:schemeClr val="accent1"/>
           </a:effectRef>
           <a:fontRef idx="minor">
             <a:schemeClr val="tx1"/>

</xml_diff>